<commit_message>
phase 2 section end project done
</commit_message>
<xml_diff>
--- a/Phase 1/Step 2.pptx
+++ b/Phase 1/Step 2.pptx
@@ -15,7 +15,8 @@
     <p:sldId id="263" r:id="rId9"/>
     <p:sldId id="264" r:id="rId10"/>
     <p:sldId id="265" r:id="rId11"/>
-    <p:sldId id="266" r:id="rId12"/>
+    <p:sldId id="267" r:id="rId12"/>
+    <p:sldId id="266" r:id="rId13"/>
   </p:sldIdLst>
   <p:sldSz cx="12192000" cy="6858000"/>
   <p:notesSz cx="6858000" cy="9144000"/>
@@ -3065,7 +3066,13 @@
       </p:sp>
       <p:pic>
         <p:nvPicPr>
-          <p:cNvPr id="4" name="Content Placeholder 3"/>
+          <p:cNvPr id="7" name="Content Placeholder 6">
+            <a:extLst>
+              <a:ext uri="{FF2B5EF4-FFF2-40B4-BE49-F238E27FC236}">
+                <a16:creationId xmlns:a16="http://schemas.microsoft.com/office/drawing/2014/main" id="{F5BBB236-E877-5BBB-212A-3C16ED44118E}"/>
+              </a:ext>
+            </a:extLst>
+          </p:cNvPr>
           <p:cNvPicPr>
             <a:picLocks noGrp="1" noChangeAspect="1"/>
           </p:cNvPicPr>
@@ -3081,12 +3088,9 @@
         </p:blipFill>
         <p:spPr>
           <a:xfrm>
-            <a:off x="1485765" y="1690688"/>
-            <a:ext cx="8814069" cy="4351338"/>
+            <a:off x="261256" y="1825625"/>
+            <a:ext cx="11168743" cy="4836432"/>
           </a:xfrm>
-          <a:prstGeom prst="rect">
-            <a:avLst/>
-          </a:prstGeom>
         </p:spPr>
       </p:pic>
     </p:spTree>
@@ -3103,6 +3107,116 @@
 </file>
 
 <file path=ppt/slides/slide11.xml><?xml version="1.0" encoding="utf-8"?>
+<p:sld xmlns:a="http://schemas.openxmlformats.org/drawingml/2006/main" xmlns:r="http://schemas.openxmlformats.org/officeDocument/2006/relationships" xmlns:p="http://schemas.openxmlformats.org/presentationml/2006/main">
+  <p:cSld>
+    <p:spTree>
+      <p:nvGrpSpPr>
+        <p:cNvPr id="1" name=""/>
+        <p:cNvGrpSpPr/>
+        <p:nvPr/>
+      </p:nvGrpSpPr>
+      <p:grpSpPr>
+        <a:xfrm>
+          <a:off x="0" y="0"/>
+          <a:ext cx="0" cy="0"/>
+          <a:chOff x="0" y="0"/>
+          <a:chExt cx="0" cy="0"/>
+        </a:xfrm>
+      </p:grpSpPr>
+      <p:sp>
+        <p:nvSpPr>
+          <p:cNvPr id="2" name="Title 1">
+            <a:extLst>
+              <a:ext uri="{FF2B5EF4-FFF2-40B4-BE49-F238E27FC236}">
+                <a16:creationId xmlns:a16="http://schemas.microsoft.com/office/drawing/2014/main" id="{AF3F85CF-5FA9-4E4B-E252-638CF77FC983}"/>
+              </a:ext>
+            </a:extLst>
+          </p:cNvPr>
+          <p:cNvSpPr>
+            <a:spLocks noGrp="1"/>
+          </p:cNvSpPr>
+          <p:nvPr>
+            <p:ph type="title"/>
+          </p:nvPr>
+        </p:nvSpPr>
+        <p:spPr/>
+        <p:txBody>
+          <a:bodyPr/>
+          <a:lstStyle/>
+          <a:p>
+            <a:r>
+              <a:rPr lang="en-IN" dirty="0"/>
+              <a:t>Remote repository </a:t>
+            </a:r>
+            <a:r>
+              <a:rPr lang="en-IN" dirty="0" err="1"/>
+              <a:t>url</a:t>
+            </a:r>
+            <a:r>
+              <a:rPr lang="en-IN" dirty="0"/>
+              <a:t> is </a:t>
+            </a:r>
+          </a:p>
+        </p:txBody>
+      </p:sp>
+      <p:sp>
+        <p:nvSpPr>
+          <p:cNvPr id="3" name="Content Placeholder 2">
+            <a:extLst>
+              <a:ext uri="{FF2B5EF4-FFF2-40B4-BE49-F238E27FC236}">
+                <a16:creationId xmlns:a16="http://schemas.microsoft.com/office/drawing/2014/main" id="{3E5711B5-B79A-BD26-8A98-172F9D102401}"/>
+              </a:ext>
+            </a:extLst>
+          </p:cNvPr>
+          <p:cNvSpPr>
+            <a:spLocks noGrp="1"/>
+          </p:cNvSpPr>
+          <p:nvPr>
+            <p:ph idx="1"/>
+          </p:nvPr>
+        </p:nvSpPr>
+        <p:spPr/>
+        <p:txBody>
+          <a:bodyPr/>
+          <a:lstStyle/>
+          <a:p>
+            <a:endParaRPr lang="en-IN" sz="1800" dirty="0">
+              <a:solidFill>
+                <a:prstClr val="black"/>
+              </a:solidFill>
+              <a:latin typeface="Lucida Console" panose="020B0609040504020204" pitchFamily="49" charset="0"/>
+            </a:endParaRPr>
+          </a:p>
+          <a:p>
+            <a:r>
+              <a:rPr lang="en-IN" sz="4000" dirty="0">
+                <a:solidFill>
+                  <a:prstClr val="black"/>
+                </a:solidFill>
+                <a:latin typeface="Lucida Console" panose="020B0609040504020204" pitchFamily="49" charset="0"/>
+              </a:rPr>
+              <a:t>https://github.com/Kaleakash/mern_stack_running_capstone_project.git</a:t>
+            </a:r>
+          </a:p>
+          <a:p>
+            <a:endParaRPr lang="en-IN" b="1" dirty="0"/>
+          </a:p>
+        </p:txBody>
+      </p:sp>
+    </p:spTree>
+    <p:extLst>
+      <p:ext uri="{BB962C8B-B14F-4D97-AF65-F5344CB8AC3E}">
+        <p14:creationId xmlns:p14="http://schemas.microsoft.com/office/powerpoint/2010/main" val="3987367527"/>
+      </p:ext>
+    </p:extLst>
+  </p:cSld>
+  <p:clrMapOvr>
+    <a:masterClrMapping/>
+  </p:clrMapOvr>
+</p:sld>
+</file>
+
+<file path=ppt/slides/slide12.xml><?xml version="1.0" encoding="utf-8"?>
 <p:sld xmlns:a="http://schemas.openxmlformats.org/drawingml/2006/main" xmlns:r="http://schemas.openxmlformats.org/officeDocument/2006/relationships" xmlns:p="http://schemas.openxmlformats.org/presentationml/2006/main">
   <p:cSld>
     <p:spTree>

</xml_diff>